<commit_message>
Presentation/ Adding Repository Reference
</commit_message>
<xml_diff>
--- a/CASE STUDY PRESENTATION.pptx
+++ b/CASE STUDY PRESENTATION.pptx
@@ -22509,9 +22509,70 @@
                 <a:cs typeface="Times New Roman"/>
                 <a:sym typeface="Times New Roman"/>
               </a:rPr>
-              <a:t>[14] https://jakevdp.github.io/PythonDataScienceHandbook/04.14-visualization-with-seaborn.html</a:t>
+              <a:t>[14] </a:t>
             </a:r>
-            <a:endParaRPr/>
+            <a:r>
+              <a:rPr lang="en-CA" sz="1295" u="sng">
+                <a:solidFill>
+                  <a:schemeClr val="hlink"/>
+                </a:solidFill>
+                <a:latin typeface="Times New Roman"/>
+                <a:ea typeface="Times New Roman"/>
+                <a:cs typeface="Times New Roman"/>
+                <a:sym typeface="Times New Roman"/>
+                <a:hlinkClick r:id="rId3"/>
+              </a:rPr>
+              <a:t>https://jakevdp.github.io/PythonDataScienceHandbook/04.14-visualization-with-seaborn.html</a:t>
+            </a:r>
+            <a:endParaRPr sz="1295">
+              <a:latin typeface="Times New Roman"/>
+              <a:ea typeface="Times New Roman"/>
+              <a:cs typeface="Times New Roman"/>
+              <a:sym typeface="Times New Roman"/>
+            </a:endParaRPr>
+          </a:p>
+          <a:p>
+            <a:pPr indent="0" lvl="0" marL="0" rtl="0" algn="l">
+              <a:lnSpc>
+                <a:spcPct val="100000"/>
+              </a:lnSpc>
+              <a:spcBef>
+                <a:spcPts val="1000"/>
+              </a:spcBef>
+              <a:spcAft>
+                <a:spcPts val="0"/>
+              </a:spcAft>
+              <a:buSzPts val="1295"/>
+              <a:buNone/>
+            </a:pPr>
+            <a:r>
+              <a:rPr lang="en-CA" sz="1295">
+                <a:latin typeface="Times New Roman"/>
+                <a:ea typeface="Times New Roman"/>
+                <a:cs typeface="Times New Roman"/>
+                <a:sym typeface="Times New Roman"/>
+              </a:rPr>
+              <a:t>[15] Repository Reference: </a:t>
+            </a:r>
+            <a:r>
+              <a:rPr lang="en-CA" sz="1100" u="sng">
+                <a:solidFill>
+                  <a:schemeClr val="hlink"/>
+                </a:solidFill>
+                <a:latin typeface="Arial"/>
+                <a:ea typeface="Arial"/>
+                <a:cs typeface="Arial"/>
+                <a:sym typeface="Arial"/>
+                <a:hlinkClick r:id="rId4"/>
+              </a:rPr>
+              <a:t>https://github.com/Jiwant/Project-InfluxDB</a:t>
+            </a:r>
+            <a:endParaRPr sz="1295">
+              <a:latin typeface="Times New Roman"/>
+              <a:ea typeface="Times New Roman"/>
+              <a:cs typeface="Times New Roman"/>
+              <a:sym typeface="Times New Roman"/>
+            </a:endParaRPr>
           </a:p>
         </p:txBody>
       </p:sp>

</xml_diff>